<commit_message>
Report add and readme
</commit_message>
<xml_diff>
--- a/Reports/Week 3 Report.pptx
+++ b/Reports/Week 3 Report.pptx
@@ -7248,64 +7248,34 @@
               <a:buChar char="-"/>
             </a:pPr>
             <a:r>
-              <a:rPr lang="en-US" dirty="0"/>
-              <a:t>Investigate what’s </a:t>
-            </a:r>
-            <a:r>
-              <a:rPr lang="en-US" b="1" i="0" dirty="0" err="1">
-                <a:solidFill>
-                  <a:srgbClr val="1C1E21"/>
-                </a:solidFill>
-                <a:effectLst/>
-                <a:latin typeface="v-sans"/>
-              </a:rPr>
-              <a:t>WarpGPT</a:t>
-            </a:r>
-            <a:r>
-              <a:rPr lang="en-US" b="1" i="0" dirty="0">
-                <a:solidFill>
-                  <a:srgbClr val="1C1E21"/>
-                </a:solidFill>
-                <a:effectLst/>
-                <a:latin typeface="v-sans"/>
-              </a:rPr>
-              <a:t> and how to connect </a:t>
-            </a:r>
-            <a:r>
-              <a:rPr lang="en-US" b="1" i="0" dirty="0" err="1">
-                <a:solidFill>
-                  <a:srgbClr val="1C1E21"/>
-                </a:solidFill>
-                <a:effectLst/>
-                <a:latin typeface="v-sans"/>
-              </a:rPr>
-              <a:t>mcp</a:t>
-            </a:r>
-            <a:r>
-              <a:rPr lang="en-US" b="1" i="0" dirty="0">
-                <a:solidFill>
-                  <a:srgbClr val="1C1E21"/>
-                </a:solidFill>
-                <a:effectLst/>
-                <a:latin typeface="v-sans"/>
-              </a:rPr>
-              <a:t> with it </a:t>
-            </a:r>
-          </a:p>
-          <a:p>
-            <a:pPr marL="285750" indent="-285750">
-              <a:buFontTx/>
-              <a:buChar char="-"/>
-            </a:pPr>
-            <a:r>
               <a:rPr lang="en-US" dirty="0">
                 <a:solidFill>
                   <a:srgbClr val="1C1E21"/>
                 </a:solidFill>
                 <a:latin typeface="v-sans"/>
               </a:rPr>
-              <a:t>Poster Submission (SSDM)</a:t>
-            </a:r>
+              <a:t>Poster Submission (SSDM) -&gt; MCP to talk to </a:t>
+            </a:r>
+            <a:r>
+              <a:rPr lang="en-US" dirty="0" err="1">
+                <a:solidFill>
+                  <a:srgbClr val="1C1E21"/>
+                </a:solidFill>
+                <a:latin typeface="v-sans"/>
+              </a:rPr>
+              <a:t>iowarp</a:t>
+            </a:r>
+            <a:r>
+              <a:rPr lang="en-US" dirty="0">
+                <a:solidFill>
+                  <a:srgbClr val="1C1E21"/>
+                </a:solidFill>
+                <a:latin typeface="v-sans"/>
+              </a:rPr>
+              <a:t> docker container ()</a:t>
+            </a:r>
+          </a:p>
+          <a:p>
             <a:endParaRPr lang="en-US" dirty="0"/>
           </a:p>
           <a:p>
@@ -8419,6 +8389,35 @@
 </file>
 
 <file path=customXml/item1.xml><?xml version="1.0" encoding="utf-8"?>
+<?mso-contentType ?>
+<FormTemplates xmlns="http://schemas.microsoft.com/sharepoint/v3/contenttype/forms">
+  <Display>DocumentLibraryForm</Display>
+  <Edit>DocumentLibraryForm</Edit>
+  <New>DocumentLibraryForm</New>
+</FormTemplates>
+</file>
+
+<file path=customXml/item2.xml><?xml version="1.0" encoding="utf-8"?>
+<p:properties xmlns:p="http://schemas.microsoft.com/office/2006/metadata/properties" xmlns:xsi="http://www.w3.org/2001/XMLSchema-instance" xmlns:pc="http://schemas.microsoft.com/office/infopath/2007/PartnerControls">
+  <documentManagement>
+    <_ip_UnifiedCompliancePolicyUIAction xmlns="http://schemas.microsoft.com/sharepoint/v3" xsi:nil="true"/>
+    <Image xmlns="71af3243-3dd4-4a8d-8c0d-dd76da1f02a5">
+      <Url xsi:nil="true"/>
+      <Description xsi:nil="true"/>
+    </Image>
+    <Status xmlns="71af3243-3dd4-4a8d-8c0d-dd76da1f02a5">Not started</Status>
+    <Background xmlns="71af3243-3dd4-4a8d-8c0d-dd76da1f02a5">false</Background>
+    <_ip_UnifiedCompliancePolicyProperties xmlns="http://schemas.microsoft.com/sharepoint/v3" xsi:nil="true"/>
+    <ImageTagsTaxHTField xmlns="71af3243-3dd4-4a8d-8c0d-dd76da1f02a5">
+      <Terms xmlns="http://schemas.microsoft.com/office/infopath/2007/PartnerControls"/>
+    </ImageTagsTaxHTField>
+    <TaxCatchAll xmlns="230e9df3-be65-4c73-a93b-d1236ebd677e" xsi:nil="true"/>
+    <MediaServiceKeyPoints xmlns="71af3243-3dd4-4a8d-8c0d-dd76da1f02a5" xsi:nil="true"/>
+  </documentManagement>
+</p:properties>
+</file>
+
+<file path=customXml/item3.xml><?xml version="1.0" encoding="utf-8"?>
 <ct:contentTypeSchema xmlns:ct="http://schemas.microsoft.com/office/2006/metadata/contentType" xmlns:ma="http://schemas.microsoft.com/office/2006/metadata/properties/metaAttributes" ct:_="" ma:_="" ma:contentTypeName="Document" ma:contentTypeID="0x01010079F111ED35F8CC479449609E8A0923A6" ma:contentTypeVersion="28" ma:contentTypeDescription="Create a new document." ma:contentTypeScope="" ma:versionID="60f5a4f2d2b0abadcf532d48ebf9cb71">
   <xsd:schema xmlns:xsd="http://www.w3.org/2001/XMLSchema" xmlns:xs="http://www.w3.org/2001/XMLSchema" xmlns:p="http://schemas.microsoft.com/office/2006/metadata/properties" xmlns:ns1="http://schemas.microsoft.com/sharepoint/v3" xmlns:ns2="71af3243-3dd4-4a8d-8c0d-dd76da1f02a5" xmlns:ns3="16c05727-aa75-4e4a-9b5f-8a80a1165891" xmlns:ns4="230e9df3-be65-4c73-a93b-d1236ebd677e" targetNamespace="http://schemas.microsoft.com/office/2006/metadata/properties" ma:root="true" ma:fieldsID="7dd78129e6a1811f84807ad11c651531" ns1:_="" ns2:_="" ns3:_="" ns4:_="">
     <xsd:import namespace="http://schemas.microsoft.com/sharepoint/v3"/>
@@ -8730,36 +8729,27 @@
 </ct:contentTypeSchema>
 </file>
 
-<file path=customXml/item2.xml><?xml version="1.0" encoding="utf-8"?>
-<p:properties xmlns:p="http://schemas.microsoft.com/office/2006/metadata/properties" xmlns:xsi="http://www.w3.org/2001/XMLSchema-instance" xmlns:pc="http://schemas.microsoft.com/office/infopath/2007/PartnerControls">
-  <documentManagement>
-    <_ip_UnifiedCompliancePolicyUIAction xmlns="http://schemas.microsoft.com/sharepoint/v3" xsi:nil="true"/>
-    <Image xmlns="71af3243-3dd4-4a8d-8c0d-dd76da1f02a5">
-      <Url xsi:nil="true"/>
-      <Description xsi:nil="true"/>
-    </Image>
-    <Status xmlns="71af3243-3dd4-4a8d-8c0d-dd76da1f02a5">Not started</Status>
-    <Background xmlns="71af3243-3dd4-4a8d-8c0d-dd76da1f02a5">false</Background>
-    <_ip_UnifiedCompliancePolicyProperties xmlns="http://schemas.microsoft.com/sharepoint/v3" xsi:nil="true"/>
-    <ImageTagsTaxHTField xmlns="71af3243-3dd4-4a8d-8c0d-dd76da1f02a5">
-      <Terms xmlns="http://schemas.microsoft.com/office/infopath/2007/PartnerControls"/>
-    </ImageTagsTaxHTField>
-    <TaxCatchAll xmlns="230e9df3-be65-4c73-a93b-d1236ebd677e" xsi:nil="true"/>
-    <MediaServiceKeyPoints xmlns="71af3243-3dd4-4a8d-8c0d-dd76da1f02a5" xsi:nil="true"/>
-  </documentManagement>
-</p:properties>
+<file path=customXml/itemProps1.xml><?xml version="1.0" encoding="utf-8"?>
+<ds:datastoreItem xmlns:ds="http://schemas.openxmlformats.org/officeDocument/2006/customXml" ds:itemID="{CABF691C-888B-4061-8A6F-D5CE84A0254B}">
+  <ds:schemaRefs>
+    <ds:schemaRef ds:uri="http://schemas.microsoft.com/sharepoint/v3/contenttype/forms"/>
+  </ds:schemaRefs>
+</ds:datastoreItem>
 </file>
 
-<file path=customXml/item3.xml><?xml version="1.0" encoding="utf-8"?>
-<?mso-contentType ?>
-<FormTemplates xmlns="http://schemas.microsoft.com/sharepoint/v3/contenttype/forms">
-  <Display>DocumentLibraryForm</Display>
-  <Edit>DocumentLibraryForm</Edit>
-  <New>DocumentLibraryForm</New>
-</FormTemplates>
+<file path=customXml/itemProps2.xml><?xml version="1.0" encoding="utf-8"?>
+<ds:datastoreItem xmlns:ds="http://schemas.openxmlformats.org/officeDocument/2006/customXml" ds:itemID="{49168DCE-134F-4610-A6AA-88CEBE8D71D2}">
+  <ds:schemaRefs>
+    <ds:schemaRef ds:uri="http://schemas.microsoft.com/office/2006/metadata/properties"/>
+    <ds:schemaRef ds:uri="http://schemas.microsoft.com/office/infopath/2007/PartnerControls"/>
+    <ds:schemaRef ds:uri="http://schemas.microsoft.com/sharepoint/v3"/>
+    <ds:schemaRef ds:uri="71af3243-3dd4-4a8d-8c0d-dd76da1f02a5"/>
+    <ds:schemaRef ds:uri="230e9df3-be65-4c73-a93b-d1236ebd677e"/>
+  </ds:schemaRefs>
+</ds:datastoreItem>
 </file>
 
-<file path=customXml/itemProps1.xml><?xml version="1.0" encoding="utf-8"?>
+<file path=customXml/itemProps3.xml><?xml version="1.0" encoding="utf-8"?>
 <ds:datastoreItem xmlns:ds="http://schemas.openxmlformats.org/officeDocument/2006/customXml" ds:itemID="{5EDE3176-A15D-46A3-BDDB-64A0D7363224}">
   <ds:schemaRefs>
     <ds:schemaRef ds:uri="http://schemas.microsoft.com/office/2006/metadata/contentType"/>
@@ -8780,26 +8770,6 @@
 </ds:datastoreItem>
 </file>
 
-<file path=customXml/itemProps2.xml><?xml version="1.0" encoding="utf-8"?>
-<ds:datastoreItem xmlns:ds="http://schemas.openxmlformats.org/officeDocument/2006/customXml" ds:itemID="{49168DCE-134F-4610-A6AA-88CEBE8D71D2}">
-  <ds:schemaRefs>
-    <ds:schemaRef ds:uri="http://schemas.microsoft.com/office/2006/metadata/properties"/>
-    <ds:schemaRef ds:uri="http://schemas.microsoft.com/office/infopath/2007/PartnerControls"/>
-    <ds:schemaRef ds:uri="http://schemas.microsoft.com/sharepoint/v3"/>
-    <ds:schemaRef ds:uri="71af3243-3dd4-4a8d-8c0d-dd76da1f02a5"/>
-    <ds:schemaRef ds:uri="230e9df3-be65-4c73-a93b-d1236ebd677e"/>
-  </ds:schemaRefs>
-</ds:datastoreItem>
-</file>
-
-<file path=customXml/itemProps3.xml><?xml version="1.0" encoding="utf-8"?>
-<ds:datastoreItem xmlns:ds="http://schemas.openxmlformats.org/officeDocument/2006/customXml" ds:itemID="{CABF691C-888B-4061-8A6F-D5CE84A0254B}">
-  <ds:schemaRefs>
-    <ds:schemaRef ds:uri="http://schemas.microsoft.com/sharepoint/v3/contenttype/forms"/>
-  </ds:schemaRefs>
-</ds:datastoreItem>
-</file>
-
 <file path=docMetadata/LabelInfo.xml><?xml version="1.0" encoding="utf-8"?>
 <clbl:labelList xmlns:clbl="http://schemas.microsoft.com/office/2020/mipLabelMetadata"/>
 </file>
</xml_diff>